<commit_message>
Resubmission based on mid-semester feedback
</commit_message>
<xml_diff>
--- a/Documentation/Mid_term/Evaluation_metrics.pptx
+++ b/Documentation/Mid_term/Evaluation_metrics.pptx
@@ -11,8 +11,7 @@
     <p:sldId id="259" r:id="rId5"/>
     <p:sldId id="260" r:id="rId6"/>
     <p:sldId id="261" r:id="rId7"/>
-    <p:sldId id="262" r:id="rId8"/>
-    <p:sldId id="263" r:id="rId9"/>
+    <p:sldId id="263" r:id="rId8"/>
   </p:sldIdLst>
   <p:sldSz cx="12192000" cy="6858000"/>
   <p:notesSz cx="6858000" cy="9144000"/>
@@ -117,6 +116,27 @@
     </p:ext>
   </p:extLst>
 </p:presentation>
+</file>
+
+<file path=ppt/changesInfos/changesInfo1.xml><?xml version="1.0" encoding="utf-8"?>
+<pc:chgInfo xmlns:a="http://schemas.openxmlformats.org/drawingml/2006/main" xmlns:r="http://schemas.openxmlformats.org/officeDocument/2006/relationships" xmlns:ac="http://schemas.microsoft.com/office/drawing/2013/main/command" xmlns:pc="http://schemas.microsoft.com/office/powerpoint/2013/main/command">
+  <pc:docChgLst>
+    <pc:chgData name="Taruchit Goyal" userId="720c1dff0585f03d" providerId="LiveId" clId="{EA40E81C-824F-43C9-A4C3-AC15C8A09225}"/>
+    <pc:docChg chg="delSld">
+      <pc:chgData name="Taruchit Goyal" userId="720c1dff0585f03d" providerId="LiveId" clId="{EA40E81C-824F-43C9-A4C3-AC15C8A09225}" dt="2025-01-28T14:05:03.961" v="0" actId="2696"/>
+      <pc:docMkLst>
+        <pc:docMk/>
+      </pc:docMkLst>
+      <pc:sldChg chg="del">
+        <pc:chgData name="Taruchit Goyal" userId="720c1dff0585f03d" providerId="LiveId" clId="{EA40E81C-824F-43C9-A4C3-AC15C8A09225}" dt="2025-01-28T14:05:03.961" v="0" actId="2696"/>
+        <pc:sldMkLst>
+          <pc:docMk/>
+          <pc:sldMk cId="136794809" sldId="262"/>
+        </pc:sldMkLst>
+      </pc:sldChg>
+    </pc:docChg>
+  </pc:docChgLst>
+</pc:chgInfo>
 </file>
 
 <file path=ppt/slideLayouts/slideLayout1.xml><?xml version="1.0" encoding="utf-8"?>
@@ -4146,86 +4166,6 @@
           <p:cNvPr id="2" name="Title 1">
             <a:extLst>
               <a:ext uri="{FF2B5EF4-FFF2-40B4-BE49-F238E27FC236}">
-                <a16:creationId xmlns:a16="http://schemas.microsoft.com/office/drawing/2014/main" id="{609ABCC8-5322-1FA7-6E7A-2F70D00EA0EB}"/>
-              </a:ext>
-            </a:extLst>
-          </p:cNvPr>
-          <p:cNvSpPr>
-            <a:spLocks noGrp="1"/>
-          </p:cNvSpPr>
-          <p:nvPr>
-            <p:ph type="title"/>
-          </p:nvPr>
-        </p:nvSpPr>
-        <p:spPr/>
-        <p:txBody>
-          <a:bodyPr/>
-          <a:lstStyle/>
-          <a:p>
-            <a:endParaRPr lang="en-IN" dirty="0"/>
-          </a:p>
-        </p:txBody>
-      </p:sp>
-      <p:sp>
-        <p:nvSpPr>
-          <p:cNvPr id="3" name="Content Placeholder 2">
-            <a:extLst>
-              <a:ext uri="{FF2B5EF4-FFF2-40B4-BE49-F238E27FC236}">
-                <a16:creationId xmlns:a16="http://schemas.microsoft.com/office/drawing/2014/main" id="{3D9DEE13-A2AE-E067-7351-22958AA30372}"/>
-              </a:ext>
-            </a:extLst>
-          </p:cNvPr>
-          <p:cNvSpPr>
-            <a:spLocks noGrp="1"/>
-          </p:cNvSpPr>
-          <p:nvPr>
-            <p:ph idx="1"/>
-          </p:nvPr>
-        </p:nvSpPr>
-        <p:spPr/>
-        <p:txBody>
-          <a:bodyPr/>
-          <a:lstStyle/>
-          <a:p>
-            <a:endParaRPr lang="en-IN"/>
-          </a:p>
-        </p:txBody>
-      </p:sp>
-    </p:spTree>
-    <p:extLst>
-      <p:ext uri="{BB962C8B-B14F-4D97-AF65-F5344CB8AC3E}">
-        <p14:creationId xmlns:p14="http://schemas.microsoft.com/office/powerpoint/2010/main" val="136794809"/>
-      </p:ext>
-    </p:extLst>
-  </p:cSld>
-  <p:clrMapOvr>
-    <a:masterClrMapping/>
-  </p:clrMapOvr>
-</p:sld>
-</file>
-
-<file path=ppt/slides/slide8.xml><?xml version="1.0" encoding="utf-8"?>
-<p:sld xmlns:a="http://schemas.openxmlformats.org/drawingml/2006/main" xmlns:r="http://schemas.openxmlformats.org/officeDocument/2006/relationships" xmlns:p="http://schemas.openxmlformats.org/presentationml/2006/main">
-  <p:cSld>
-    <p:spTree>
-      <p:nvGrpSpPr>
-        <p:cNvPr id="1" name=""/>
-        <p:cNvGrpSpPr/>
-        <p:nvPr/>
-      </p:nvGrpSpPr>
-      <p:grpSpPr>
-        <a:xfrm>
-          <a:off x="0" y="0"/>
-          <a:ext cx="0" cy="0"/>
-          <a:chOff x="0" y="0"/>
-          <a:chExt cx="0" cy="0"/>
-        </a:xfrm>
-      </p:grpSpPr>
-      <p:sp>
-        <p:nvSpPr>
-          <p:cNvPr id="2" name="Title 1">
-            <a:extLst>
-              <a:ext uri="{FF2B5EF4-FFF2-40B4-BE49-F238E27FC236}">
                 <a16:creationId xmlns:a16="http://schemas.microsoft.com/office/drawing/2014/main" id="{00D3683F-B97E-3CED-1E50-46C264AFCE62}"/>
               </a:ext>
             </a:extLst>

</xml_diff>